<commit_message>
Last Slide "Merci Pour votre Attention"
</commit_message>
<xml_diff>
--- a/Presentation.pptx
+++ b/Presentation.pptx
@@ -5,7 +5,7 @@
     <p:sldMasterId id="2147484278" r:id="rId1"/>
   </p:sldMasterIdLst>
   <p:notesMasterIdLst>
-    <p:notesMasterId r:id="rId16"/>
+    <p:notesMasterId r:id="rId17"/>
   </p:notesMasterIdLst>
   <p:sldIdLst>
     <p:sldId id="262" r:id="rId2"/>
@@ -22,6 +22,7 @@
     <p:sldId id="261" r:id="rId13"/>
     <p:sldId id="270" r:id="rId14"/>
     <p:sldId id="271" r:id="rId15"/>
+    <p:sldId id="272" r:id="rId16"/>
   </p:sldIdLst>
   <p:sldSz cx="12192000" cy="6858000"/>
   <p:notesSz cx="6858000" cy="9144000"/>
@@ -3255,7 +3256,7 @@
           <a:p>
             <a:fld id="{30972B6B-B5CF-41E4-B246-750F6E702F96}" type="slidenum">
               <a:rPr lang="fr-FR" smtClean="0"/>
-              <a:t>‹N°›</a:t>
+              <a:t>‹#›</a:t>
             </a:fld>
             <a:endParaRPr lang="fr-FR"/>
           </a:p>
@@ -4154,7 +4155,7 @@
           <a:p>
             <a:fld id="{7F2870A4-FAE2-438A-8102-A1D6C3BFD565}" type="slidenum">
               <a:rPr lang="en-US" smtClean="0"/>
-              <a:t>‹N°›</a:t>
+              <a:t>‹#›</a:t>
             </a:fld>
             <a:endParaRPr lang="en-US"/>
           </a:p>
@@ -4325,7 +4326,7 @@
           <a:p>
             <a:fld id="{7F2870A4-FAE2-438A-8102-A1D6C3BFD565}" type="slidenum">
               <a:rPr lang="en-US" smtClean="0"/>
-              <a:t>‹N°›</a:t>
+              <a:t>‹#›</a:t>
             </a:fld>
             <a:endParaRPr lang="en-US"/>
           </a:p>
@@ -4506,7 +4507,7 @@
           <a:p>
             <a:fld id="{7F2870A4-FAE2-438A-8102-A1D6C3BFD565}" type="slidenum">
               <a:rPr lang="en-US" smtClean="0"/>
-              <a:t>‹N°›</a:t>
+              <a:t>‹#›</a:t>
             </a:fld>
             <a:endParaRPr lang="en-US"/>
           </a:p>
@@ -4677,7 +4678,7 @@
           <a:p>
             <a:fld id="{7F2870A4-FAE2-438A-8102-A1D6C3BFD565}" type="slidenum">
               <a:rPr lang="en-US" smtClean="0"/>
-              <a:t>‹N°›</a:t>
+              <a:t>‹#›</a:t>
             </a:fld>
             <a:endParaRPr lang="en-US"/>
           </a:p>
@@ -5089,7 +5090,7 @@
           <a:p>
             <a:fld id="{7F2870A4-FAE2-438A-8102-A1D6C3BFD565}" type="slidenum">
               <a:rPr lang="en-US" smtClean="0"/>
-              <a:t>‹N°›</a:t>
+              <a:t>‹#›</a:t>
             </a:fld>
             <a:endParaRPr lang="en-US"/>
           </a:p>
@@ -5378,7 +5379,7 @@
           <a:p>
             <a:fld id="{7F2870A4-FAE2-438A-8102-A1D6C3BFD565}" type="slidenum">
               <a:rPr lang="en-US" smtClean="0"/>
-              <a:t>‹N°›</a:t>
+              <a:t>‹#›</a:t>
             </a:fld>
             <a:endParaRPr lang="en-US"/>
           </a:p>
@@ -5813,7 +5814,7 @@
           <a:p>
             <a:fld id="{7F2870A4-FAE2-438A-8102-A1D6C3BFD565}" type="slidenum">
               <a:rPr lang="en-US" smtClean="0"/>
-              <a:t>‹N°›</a:t>
+              <a:t>‹#›</a:t>
             </a:fld>
             <a:endParaRPr lang="en-US"/>
           </a:p>
@@ -5932,7 +5933,7 @@
           <a:p>
             <a:fld id="{7F2870A4-FAE2-438A-8102-A1D6C3BFD565}" type="slidenum">
               <a:rPr lang="en-US" smtClean="0"/>
-              <a:t>‹N°›</a:t>
+              <a:t>‹#›</a:t>
             </a:fld>
             <a:endParaRPr lang="en-US"/>
           </a:p>
@@ -6028,7 +6029,7 @@
           <a:p>
             <a:fld id="{7F2870A4-FAE2-438A-8102-A1D6C3BFD565}" type="slidenum">
               <a:rPr lang="en-US" smtClean="0"/>
-              <a:t>‹N°›</a:t>
+              <a:t>‹#›</a:t>
             </a:fld>
             <a:endParaRPr lang="en-US"/>
           </a:p>
@@ -6468,7 +6469,7 @@
           <a:p>
             <a:fld id="{7F2870A4-FAE2-438A-8102-A1D6C3BFD565}" type="slidenum">
               <a:rPr lang="en-US" smtClean="0"/>
-              <a:t>‹N°›</a:t>
+              <a:t>‹#›</a:t>
             </a:fld>
             <a:endParaRPr lang="en-US"/>
           </a:p>
@@ -6875,7 +6876,7 @@
           <a:p>
             <a:fld id="{7F2870A4-FAE2-438A-8102-A1D6C3BFD565}" type="slidenum">
               <a:rPr lang="en-US" smtClean="0"/>
-              <a:t>‹N°›</a:t>
+              <a:t>‹#›</a:t>
             </a:fld>
             <a:endParaRPr lang="en-US"/>
           </a:p>
@@ -7214,7 +7215,7 @@
           <a:p>
             <a:fld id="{7F2870A4-FAE2-438A-8102-A1D6C3BFD565}" type="slidenum">
               <a:rPr lang="en-US" smtClean="0"/>
-              <a:t>‹N°›</a:t>
+              <a:t>‹#›</a:t>
             </a:fld>
             <a:endParaRPr lang="en-US"/>
           </a:p>
@@ -10953,11 +10954,11 @@
   <p:clrMapOvr>
     <a:masterClrMapping/>
   </p:clrMapOvr>
-  <mc:AlternateContent xmlns:mc="http://schemas.openxmlformats.org/markup-compatibility/2006">
-    <mc:Choice xmlns:p14="http://schemas.microsoft.com/office/powerpoint/2010/main" Requires="p14">
+  <mc:AlternateContent xmlns:mc="http://schemas.openxmlformats.org/markup-compatibility/2006" xmlns:p14="http://schemas.microsoft.com/office/powerpoint/2010/main">
+    <mc:Choice Requires="p14">
       <p:transition p14:dur="10"/>
     </mc:Choice>
-    <mc:Fallback>
+    <mc:Fallback xmlns="">
       <p:transition/>
     </mc:Fallback>
   </mc:AlternateContent>
@@ -11564,6 +11565,65 @@
       <p:bldP spid="23" grpId="1"/>
     </p:bldLst>
   </p:timing>
+</p:sld>
+</file>
+
+<file path=ppt/slides/slide15.xml><?xml version="1.0" encoding="utf-8"?>
+<p:sld xmlns:a="http://schemas.openxmlformats.org/drawingml/2006/main" xmlns:r="http://schemas.openxmlformats.org/officeDocument/2006/relationships" xmlns:p="http://schemas.openxmlformats.org/presentationml/2006/main">
+  <p:cSld>
+    <p:spTree>
+      <p:nvGrpSpPr>
+        <p:cNvPr id="1" name=""/>
+        <p:cNvGrpSpPr/>
+        <p:nvPr/>
+      </p:nvGrpSpPr>
+      <p:grpSpPr>
+        <a:xfrm>
+          <a:off x="0" y="0"/>
+          <a:ext cx="0" cy="0"/>
+          <a:chOff x="0" y="0"/>
+          <a:chExt cx="0" cy="0"/>
+        </a:xfrm>
+      </p:grpSpPr>
+      <p:sp>
+        <p:nvSpPr>
+          <p:cNvPr id="2" name="Title 1"/>
+          <p:cNvSpPr>
+            <a:spLocks noGrp="1"/>
+          </p:cNvSpPr>
+          <p:nvPr>
+            <p:ph type="title"/>
+          </p:nvPr>
+        </p:nvSpPr>
+        <p:spPr>
+          <a:xfrm>
+            <a:off x="1069848" y="2640982"/>
+            <a:ext cx="10058400" cy="1609344"/>
+          </a:xfrm>
+        </p:spPr>
+        <p:txBody>
+          <a:bodyPr/>
+          <a:lstStyle/>
+          <a:p>
+            <a:pPr algn="ctr"/>
+            <a:r>
+              <a:rPr lang="fr-FR" dirty="0" smtClean="0"/>
+              <a:t>Merci Pour votre Attention</a:t>
+            </a:r>
+            <a:endParaRPr lang="fr-FR" dirty="0"/>
+          </a:p>
+        </p:txBody>
+      </p:sp>
+    </p:spTree>
+    <p:extLst>
+      <p:ext uri="{BB962C8B-B14F-4D97-AF65-F5344CB8AC3E}">
+        <p14:creationId xmlns:p14="http://schemas.microsoft.com/office/powerpoint/2010/main" val="632466490"/>
+      </p:ext>
+    </p:extLst>
+  </p:cSld>
+  <p:clrMapOvr>
+    <a:masterClrMapping/>
+  </p:clrMapOvr>
 </p:sld>
 </file>
 

</xml_diff>